<commit_message>
Added support for nested each tags and each tags on a single line
</commit_message>
<xml_diff>
--- a/tests/templates/each-tag-simple-ok.pptx
+++ b/tests/templates/each-tag-simple-ok.pptx
@@ -259,7 +259,7 @@
           <a:p>
             <a:fld id="{CF38FE7D-FF79-0849-B092-EB0D08A0997B}" type="datetimeFigureOut">
               <a:rPr lang="fr-FR" smtClean="0"/>
-              <a:t>22/10/2022</a:t>
+              <a:t>25/11/2022</a:t>
             </a:fld>
             <a:endParaRPr lang="fr-FR"/>
           </a:p>
@@ -457,7 +457,7 @@
           <a:p>
             <a:fld id="{CF38FE7D-FF79-0849-B092-EB0D08A0997B}" type="datetimeFigureOut">
               <a:rPr lang="fr-FR" smtClean="0"/>
-              <a:t>22/10/2022</a:t>
+              <a:t>25/11/2022</a:t>
             </a:fld>
             <a:endParaRPr lang="fr-FR"/>
           </a:p>
@@ -665,7 +665,7 @@
           <a:p>
             <a:fld id="{CF38FE7D-FF79-0849-B092-EB0D08A0997B}" type="datetimeFigureOut">
               <a:rPr lang="fr-FR" smtClean="0"/>
-              <a:t>22/10/2022</a:t>
+              <a:t>25/11/2022</a:t>
             </a:fld>
             <a:endParaRPr lang="fr-FR"/>
           </a:p>
@@ -863,7 +863,7 @@
           <a:p>
             <a:fld id="{CF38FE7D-FF79-0849-B092-EB0D08A0997B}" type="datetimeFigureOut">
               <a:rPr lang="fr-FR" smtClean="0"/>
-              <a:t>22/10/2022</a:t>
+              <a:t>25/11/2022</a:t>
             </a:fld>
             <a:endParaRPr lang="fr-FR"/>
           </a:p>
@@ -1138,7 +1138,7 @@
           <a:p>
             <a:fld id="{CF38FE7D-FF79-0849-B092-EB0D08A0997B}" type="datetimeFigureOut">
               <a:rPr lang="fr-FR" smtClean="0"/>
-              <a:t>22/10/2022</a:t>
+              <a:t>25/11/2022</a:t>
             </a:fld>
             <a:endParaRPr lang="fr-FR"/>
           </a:p>
@@ -1403,7 +1403,7 @@
           <a:p>
             <a:fld id="{CF38FE7D-FF79-0849-B092-EB0D08A0997B}" type="datetimeFigureOut">
               <a:rPr lang="fr-FR" smtClean="0"/>
-              <a:t>22/10/2022</a:t>
+              <a:t>25/11/2022</a:t>
             </a:fld>
             <a:endParaRPr lang="fr-FR"/>
           </a:p>
@@ -1815,7 +1815,7 @@
           <a:p>
             <a:fld id="{CF38FE7D-FF79-0849-B092-EB0D08A0997B}" type="datetimeFigureOut">
               <a:rPr lang="fr-FR" smtClean="0"/>
-              <a:t>22/10/2022</a:t>
+              <a:t>25/11/2022</a:t>
             </a:fld>
             <a:endParaRPr lang="fr-FR"/>
           </a:p>
@@ -1956,7 +1956,7 @@
           <a:p>
             <a:fld id="{CF38FE7D-FF79-0849-B092-EB0D08A0997B}" type="datetimeFigureOut">
               <a:rPr lang="fr-FR" smtClean="0"/>
-              <a:t>22/10/2022</a:t>
+              <a:t>25/11/2022</a:t>
             </a:fld>
             <a:endParaRPr lang="fr-FR"/>
           </a:p>
@@ -2069,7 +2069,7 @@
           <a:p>
             <a:fld id="{CF38FE7D-FF79-0849-B092-EB0D08A0997B}" type="datetimeFigureOut">
               <a:rPr lang="fr-FR" smtClean="0"/>
-              <a:t>22/10/2022</a:t>
+              <a:t>25/11/2022</a:t>
             </a:fld>
             <a:endParaRPr lang="fr-FR"/>
           </a:p>
@@ -2380,7 +2380,7 @@
           <a:p>
             <a:fld id="{CF38FE7D-FF79-0849-B092-EB0D08A0997B}" type="datetimeFigureOut">
               <a:rPr lang="fr-FR" smtClean="0"/>
-              <a:t>22/10/2022</a:t>
+              <a:t>25/11/2022</a:t>
             </a:fld>
             <a:endParaRPr lang="fr-FR"/>
           </a:p>
@@ -2668,7 +2668,7 @@
           <a:p>
             <a:fld id="{CF38FE7D-FF79-0849-B092-EB0D08A0997B}" type="datetimeFigureOut">
               <a:rPr lang="fr-FR" smtClean="0"/>
-              <a:t>22/10/2022</a:t>
+              <a:t>25/11/2022</a:t>
             </a:fld>
             <a:endParaRPr lang="fr-FR"/>
           </a:p>
@@ -2909,7 +2909,7 @@
           <a:p>
             <a:fld id="{CF38FE7D-FF79-0849-B092-EB0D08A0997B}" type="datetimeFigureOut">
               <a:rPr lang="fr-FR" smtClean="0"/>
-              <a:t>22/10/2022</a:t>
+              <a:t>25/11/2022</a:t>
             </a:fld>
             <a:endParaRPr lang="fr-FR"/>
           </a:p>
@@ -3410,13 +3410,20 @@
             </a:r>
             <a:r>
               <a:rPr lang="fr-FR" dirty="0" err="1"/>
-              <a:t>name</a:t>
-            </a:r>
-            <a:r>
-              <a:rPr lang="fr-FR"/>
+              <a:t>firstName</a:t>
+            </a:r>
+            <a:r>
+              <a:rPr lang="fr-FR" dirty="0"/>
+              <a:t>}} {{</a:t>
+            </a:r>
+            <a:r>
+              <a:rPr lang="fr-FR"/>
+              <a:t>lastName</a:t>
+            </a:r>
+            <a:r>
+              <a:rPr lang="fr-FR" dirty="0"/>
               <a:t>}}</a:t>
             </a:r>
-            <a:endParaRPr lang="fr-FR" dirty="0"/>
           </a:p>
           <a:p>
             <a:pPr marL="0" indent="0">

</xml_diff>